<commit_message>
Worked on about us page and powerpoint
</commit_message>
<xml_diff>
--- a/Untitled presentation.pptx
+++ b/Untitled presentation.pptx
@@ -6247,7 +6247,7 @@
         </p:spPr>
         <p:txBody>
           <a:bodyPr anchorCtr="0" anchor="t" bIns="91425" lIns="91425" spcFirstLastPara="1" rIns="91425" wrap="square" tIns="91425">
-            <a:normAutofit/>
+            <a:normAutofit fontScale="77500"/>
           </a:bodyPr>
           <a:lstStyle/>
           <a:p>
@@ -6261,7 +6261,20 @@
               <a:buNone/>
             </a:pPr>
             <a:r>
-              <a:t/>
+              <a:rPr lang="en"/>
+              <a:t>When you look good, you feel good, you act good. Hello my name is Parth Bakhda, I am a </a:t>
+            </a:r>
+            <a:r>
+              <a:rPr lang="en"/>
+              <a:t>collaborator</a:t>
+            </a:r>
+            <a:r>
+              <a:rPr lang="en"/>
+              <a:t> for the phenomenal app Fitness Tracker. We started from </a:t>
+            </a:r>
+            <a:r>
+              <a:rPr lang="en"/>
+              <a:t>humble beginnings, working on, and fixing the quirks that make this app such a great success. At one point we all have wondered what would I look like if I were fit? well now, stop wondering, and start doing. With our fitness app we make dreams a reality. We have a group of certified trainers and nutritionist that have studied the ins and outs of what makes working out less of hassle and more progressive with results. The app has a login page where users can sign up and register, then on to the home screen which has banners and testimonies to get you pumped up. Next is the fitness diary that lets you input your exercises, duration, and weights, then to the workout page which has preloaded workout plans. It also has progress tracker that lets you keep track of your goals and tracks your fitness regiment. Lastly an about us page that has information about the collaborators and their fitness experience and specialties so you can insure you are getting professional help with individualized treatment to help you on your goals. Be all that you were meant to be Veni Vidi Vici: I came, I saw, I conquered. Download the app now don’t wait any longer.</a:t>
             </a:r>
             <a:endParaRPr/>
           </a:p>
@@ -6351,7 +6364,7 @@
         </p:spPr>
         <p:txBody>
           <a:bodyPr anchorCtr="0" anchor="t" bIns="91425" lIns="91425" spcFirstLastPara="1" rIns="91425" wrap="square" tIns="91425">
-            <a:normAutofit/>
+            <a:normAutofit fontScale="77500" lnSpcReduction="20000"/>
           </a:bodyPr>
           <a:lstStyle/>
           <a:p>
@@ -6360,12 +6373,156 @@
                 <a:spcPts val="0"/>
               </a:spcBef>
               <a:spcAft>
-                <a:spcPts val="1200"/>
-              </a:spcAft>
+                <a:spcPts val="0"/>
+              </a:spcAft>
+              <a:buClr>
+                <a:schemeClr val="dk1"/>
+              </a:buClr>
+              <a:buSzPct val="61111"/>
+              <a:buFont typeface="Arial"/>
               <a:buNone/>
             </a:pPr>
             <a:r>
-              <a:t/>
+              <a:rPr lang="en"/>
+              <a:t>Description: Fitness Tracker is an app, that tracks your fitness goals and regiments to make sure you have the knowledge you need to stay fit, and also preloaded workouts to get results.</a:t>
+            </a:r>
+            <a:endParaRPr/>
+          </a:p>
+          <a:p>
+            <a:pPr indent="0" lvl="0" marL="0" rtl="0" algn="l">
+              <a:spcBef>
+                <a:spcPts val="1200"/>
+              </a:spcBef>
+              <a:spcAft>
+                <a:spcPts val="0"/>
+              </a:spcAft>
+              <a:buClr>
+                <a:schemeClr val="dk1"/>
+              </a:buClr>
+              <a:buSzPct val="61111"/>
+              <a:buFont typeface="Arial"/>
+              <a:buNone/>
+            </a:pPr>
+            <a:r>
+              <a:rPr lang="en"/>
+              <a:t>Motivation: We at Fitness Tracker, come from </a:t>
+            </a:r>
+            <a:r>
+              <a:rPr lang="en"/>
+              <a:t>humble</a:t>
+            </a:r>
+            <a:r>
+              <a:rPr lang="en"/>
+              <a:t> </a:t>
+            </a:r>
+            <a:r>
+              <a:rPr lang="en"/>
+              <a:t>beginnings and all started in a garage, and quickly developed into a full grown company in light of the app success. Group of friends from different backgrounds and specialties were tired of losing family members and loved ones to obesity and health concerns associated with it so developed app to keep weight in check. </a:t>
+            </a:r>
+            <a:endParaRPr/>
+          </a:p>
+          <a:p>
+            <a:pPr indent="0" lvl="0" marL="0" rtl="0" algn="l">
+              <a:spcBef>
+                <a:spcPts val="1200"/>
+              </a:spcBef>
+              <a:spcAft>
+                <a:spcPts val="0"/>
+              </a:spcAft>
+              <a:buClr>
+                <a:schemeClr val="dk1"/>
+              </a:buClr>
+              <a:buSzPct val="61111"/>
+              <a:buFont typeface="Arial"/>
+              <a:buNone/>
+            </a:pPr>
+            <a:r>
+              <a:rPr lang="en"/>
+              <a:t>User Story: Fitness Tracker</a:t>
+            </a:r>
+            <a:endParaRPr/>
+          </a:p>
+          <a:p>
+            <a:pPr indent="0" lvl="0" marL="0" rtl="0" algn="l">
+              <a:spcBef>
+                <a:spcPts val="1200"/>
+              </a:spcBef>
+              <a:spcAft>
+                <a:spcPts val="0"/>
+              </a:spcAft>
+              <a:buClr>
+                <a:schemeClr val="dk1"/>
+              </a:buClr>
+              <a:buSzPct val="61111"/>
+              <a:buFont typeface="Arial"/>
+              <a:buNone/>
+            </a:pPr>
+            <a:r>
+              <a:rPr lang="en"/>
+              <a:t>As a Fitness Enthusiast</a:t>
+            </a:r>
+            <a:endParaRPr/>
+          </a:p>
+          <a:p>
+            <a:pPr indent="0" lvl="0" marL="0" rtl="0" algn="l">
+              <a:spcBef>
+                <a:spcPts val="1200"/>
+              </a:spcBef>
+              <a:spcAft>
+                <a:spcPts val="0"/>
+              </a:spcAft>
+              <a:buClr>
+                <a:schemeClr val="dk1"/>
+              </a:buClr>
+              <a:buSzPct val="61111"/>
+              <a:buFont typeface="Arial"/>
+              <a:buNone/>
+            </a:pPr>
+            <a:r>
+              <a:rPr lang="en"/>
+              <a:t>I want to use an app to help maintain/lower weight and gain muscle</a:t>
+            </a:r>
+            <a:endParaRPr/>
+          </a:p>
+          <a:p>
+            <a:pPr indent="0" lvl="0" marL="0" rtl="0" algn="l">
+              <a:spcBef>
+                <a:spcPts val="1200"/>
+              </a:spcBef>
+              <a:spcAft>
+                <a:spcPts val="0"/>
+              </a:spcAft>
+              <a:buClr>
+                <a:schemeClr val="dk1"/>
+              </a:buClr>
+              <a:buSzPct val="61111"/>
+              <a:buFont typeface="Arial"/>
+              <a:buNone/>
+            </a:pPr>
+            <a:r>
+              <a:rPr lang="en"/>
+              <a:t>So that I can stay healthy and look and feel great. </a:t>
+            </a:r>
+            <a:endParaRPr/>
+          </a:p>
+          <a:p>
+            <a:pPr indent="0" lvl="0" marL="0" rtl="0" algn="l">
+              <a:spcBef>
+                <a:spcPts val="1200"/>
+              </a:spcBef>
+              <a:spcAft>
+                <a:spcPts val="1200"/>
+              </a:spcAft>
+              <a:buClr>
+                <a:schemeClr val="dk1"/>
+              </a:buClr>
+              <a:buSzPct val="61111"/>
+              <a:buFont typeface="Arial"/>
+              <a:buNone/>
+            </a:pPr>
+            <a:r>
+              <a:rPr lang="en"/>
+              <a:t>Also track my fitness levels and diary of workouts.</a:t>
             </a:r>
             <a:endParaRPr/>
           </a:p>
@@ -6464,12 +6621,66 @@
                 <a:spcPts val="0"/>
               </a:spcBef>
               <a:spcAft>
-                <a:spcPts val="1200"/>
+                <a:spcPts val="0"/>
               </a:spcAft>
               <a:buNone/>
             </a:pPr>
             <a:r>
-              <a:t/>
+              <a:rPr lang="en"/>
+              <a:t>Technologies used Visual Studio Code, GitHub, Heroku, Mysql, and Internet.</a:t>
+            </a:r>
+            <a:endParaRPr/>
+          </a:p>
+          <a:p>
+            <a:pPr indent="0" lvl="0" marL="0" rtl="0" algn="l">
+              <a:spcBef>
+                <a:spcPts val="1200"/>
+              </a:spcBef>
+              <a:spcAft>
+                <a:spcPts val="0"/>
+              </a:spcAft>
+              <a:buNone/>
+            </a:pPr>
+            <a:r>
+              <a:rPr lang="en"/>
+              <a:t>Breakdown of tasks and roles</a:t>
+            </a:r>
+            <a:endParaRPr/>
+          </a:p>
+          <a:p>
+            <a:pPr indent="0" lvl="0" marL="0" rtl="0" algn="l">
+              <a:spcBef>
+                <a:spcPts val="1200"/>
+              </a:spcBef>
+              <a:spcAft>
+                <a:spcPts val="0"/>
+              </a:spcAft>
+              <a:buNone/>
+            </a:pPr>
+            <a:r>
+              <a:rPr lang="en"/>
+              <a:t>Challenges we encountered </a:t>
+            </a:r>
+            <a:endParaRPr/>
+          </a:p>
+          <a:p>
+            <a:pPr indent="0" lvl="0" marL="0" rtl="0" algn="l">
+              <a:spcBef>
+                <a:spcPts val="1200"/>
+              </a:spcBef>
+              <a:spcAft>
+                <a:spcPts val="1200"/>
+              </a:spcAft>
+              <a:buClr>
+                <a:schemeClr val="dk1"/>
+              </a:buClr>
+              <a:buSzPts val="1100"/>
+              <a:buFont typeface="Arial"/>
+              <a:buNone/>
+            </a:pPr>
+            <a:r>
+              <a:rPr lang="en"/>
+              <a:t>Successes we encountered</a:t>
             </a:r>
             <a:endParaRPr/>
           </a:p>
@@ -6796,6 +7007,285 @@
 </file>
 
 <file path=ppt/theme/theme1.xml><?xml version="1.0" encoding="utf-8"?>
+<a:theme xmlns:a="http://schemas.openxmlformats.org/drawingml/2006/main" xmlns:r="http://schemas.openxmlformats.org/officeDocument/2006/relationships">
+  <a:themeElements>
+    <a:clrScheme name="Default">
+      <a:dk1>
+        <a:srgbClr val="000000"/>
+      </a:dk1>
+      <a:lt1>
+        <a:srgbClr val="FFFFFF"/>
+      </a:lt1>
+      <a:dk2>
+        <a:srgbClr val="158158"/>
+      </a:dk2>
+      <a:lt2>
+        <a:srgbClr val="F3F3F3"/>
+      </a:lt2>
+      <a:accent1>
+        <a:srgbClr val="058DC7"/>
+      </a:accent1>
+      <a:accent2>
+        <a:srgbClr val="50B432"/>
+      </a:accent2>
+      <a:accent3>
+        <a:srgbClr val="ED561B"/>
+      </a:accent3>
+      <a:accent4>
+        <a:srgbClr val="EDEF00"/>
+      </a:accent4>
+      <a:accent5>
+        <a:srgbClr val="24CBE5"/>
+      </a:accent5>
+      <a:accent6>
+        <a:srgbClr val="64E572"/>
+      </a:accent6>
+      <a:hlink>
+        <a:srgbClr val="2200CC"/>
+      </a:hlink>
+      <a:folHlink>
+        <a:srgbClr val="551A8B"/>
+      </a:folHlink>
+    </a:clrScheme>
+    <a:fontScheme name="Office">
+      <a:majorFont>
+        <a:latin typeface="Arial"/>
+        <a:ea typeface=""/>
+        <a:cs typeface=""/>
+        <a:font script="Jpan" typeface="ＭＳ Ｐゴシック"/>
+        <a:font script="Hang" typeface="맑은 고딕"/>
+        <a:font script="Hans" typeface="宋体"/>
+        <a:font script="Hant" typeface="新細明體"/>
+        <a:font script="Arab" typeface="Times New Roman"/>
+        <a:font script="Hebr" typeface="Times New Roman"/>
+        <a:font script="Thai" typeface="Angsana New"/>
+        <a:font script="Ethi" typeface="Nyala"/>
+        <a:font script="Beng" typeface="Vrinda"/>
+        <a:font script="Gujr" typeface="Shruti"/>
+        <a:font script="Khmr" typeface="MoolBoran"/>
+        <a:font script="Knda" typeface="Tunga"/>
+        <a:font script="Guru" typeface="Raavi"/>
+        <a:font script="Cans" typeface="Euphemia"/>
+        <a:font script="Cher" typeface="Plantagenet Cherokee"/>
+        <a:font script="Yiii" typeface="Microsoft Yi Baiti"/>
+        <a:font script="Tibt" typeface="Microsoft Himalaya"/>
+        <a:font script="Thaa" typeface="MV Boli"/>
+        <a:font script="Deva" typeface="Mangal"/>
+        <a:font script="Telu" typeface="Gautami"/>
+        <a:font script="Taml" typeface="Latha"/>
+        <a:font script="Syrc" typeface="Estrangelo Edessa"/>
+        <a:font script="Orya" typeface="Kalinga"/>
+        <a:font script="Mlym" typeface="Kartika"/>
+        <a:font script="Laoo" typeface="DokChampa"/>
+        <a:font script="Sinh" typeface="Iskoola Pota"/>
+        <a:font script="Mong" typeface="Mongolian Baiti"/>
+        <a:font script="Viet" typeface="Times New Roman"/>
+        <a:font script="Uigh" typeface="Microsoft Uighur"/>
+        <a:font script="Geor" typeface="Sylfaen"/>
+      </a:majorFont>
+      <a:minorFont>
+        <a:latin typeface="Arial"/>
+        <a:ea typeface=""/>
+        <a:cs typeface=""/>
+        <a:font script="Jpan" typeface="ＭＳ Ｐゴシック"/>
+        <a:font script="Hang" typeface="맑은 고딕"/>
+        <a:font script="Hans" typeface="宋体"/>
+        <a:font script="Hant" typeface="新細明體"/>
+        <a:font script="Arab" typeface="Arial"/>
+        <a:font script="Hebr" typeface="Arial"/>
+        <a:font script="Thai" typeface="Cordia New"/>
+        <a:font script="Ethi" typeface="Nyala"/>
+        <a:font script="Beng" typeface="Vrinda"/>
+        <a:font script="Gujr" typeface="Shruti"/>
+        <a:font script="Khmr" typeface="DaunPenh"/>
+        <a:font script="Knda" typeface="Tunga"/>
+        <a:font script="Guru" typeface="Raavi"/>
+        <a:font script="Cans" typeface="Euphemia"/>
+        <a:font script="Cher" typeface="Plantagenet Cherokee"/>
+        <a:font script="Yiii" typeface="Microsoft Yi Baiti"/>
+        <a:font script="Tibt" typeface="Microsoft Himalaya"/>
+        <a:font script="Thaa" typeface="MV Boli"/>
+        <a:font script="Deva" typeface="Mangal"/>
+        <a:font script="Telu" typeface="Gautami"/>
+        <a:font script="Taml" typeface="Latha"/>
+        <a:font script="Syrc" typeface="Estrangelo Edessa"/>
+        <a:font script="Orya" typeface="Kalinga"/>
+        <a:font script="Mlym" typeface="Kartika"/>
+        <a:font script="Laoo" typeface="DokChampa"/>
+        <a:font script="Sinh" typeface="Iskoola Pota"/>
+        <a:font script="Mong" typeface="Mongolian Baiti"/>
+        <a:font script="Viet" typeface="Arial"/>
+        <a:font script="Uigh" typeface="Microsoft Uighur"/>
+        <a:font script="Geor" typeface="Sylfaen"/>
+      </a:minorFont>
+    </a:fontScheme>
+    <a:fmtScheme name="Office">
+      <a:fillStyleLst>
+        <a:solidFill>
+          <a:schemeClr val="phClr"/>
+        </a:solidFill>
+        <a:gradFill rotWithShape="1">
+          <a:gsLst>
+            <a:gs pos="0">
+              <a:schemeClr val="phClr">
+                <a:tint val="50000"/>
+                <a:satMod val="300000"/>
+              </a:schemeClr>
+            </a:gs>
+            <a:gs pos="35000">
+              <a:schemeClr val="phClr">
+                <a:tint val="37000"/>
+                <a:satMod val="300000"/>
+              </a:schemeClr>
+            </a:gs>
+            <a:gs pos="100000">
+              <a:schemeClr val="phClr">
+                <a:tint val="15000"/>
+                <a:satMod val="350000"/>
+              </a:schemeClr>
+            </a:gs>
+          </a:gsLst>
+          <a:lin ang="16200000" scaled="1"/>
+        </a:gradFill>
+        <a:gradFill rotWithShape="1">
+          <a:gsLst>
+            <a:gs pos="0">
+              <a:schemeClr val="phClr">
+                <a:tint val="100000"/>
+                <a:shade val="100000"/>
+                <a:satMod val="130000"/>
+              </a:schemeClr>
+            </a:gs>
+            <a:gs pos="100000">
+              <a:schemeClr val="phClr">
+                <a:tint val="50000"/>
+                <a:shade val="100000"/>
+                <a:satMod val="350000"/>
+              </a:schemeClr>
+            </a:gs>
+          </a:gsLst>
+          <a:lin ang="16200000" scaled="0"/>
+        </a:gradFill>
+      </a:fillStyleLst>
+      <a:lnStyleLst>
+        <a:ln w="9525" cap="flat" cmpd="sng" algn="ctr">
+          <a:solidFill>
+            <a:schemeClr val="phClr">
+              <a:shade val="95000"/>
+              <a:satMod val="105000"/>
+            </a:schemeClr>
+          </a:solidFill>
+          <a:prstDash val="solid"/>
+        </a:ln>
+        <a:ln w="25400" cap="flat" cmpd="sng" algn="ctr">
+          <a:solidFill>
+            <a:schemeClr val="phClr"/>
+          </a:solidFill>
+          <a:prstDash val="solid"/>
+        </a:ln>
+        <a:ln w="38100" cap="flat" cmpd="sng" algn="ctr">
+          <a:solidFill>
+            <a:schemeClr val="phClr"/>
+          </a:solidFill>
+          <a:prstDash val="solid"/>
+        </a:ln>
+      </a:lnStyleLst>
+      <a:effectStyleLst>
+        <a:effectStyle>
+          <a:effectLst>
+            <a:outerShdw blurRad="40000" dist="20000" dir="5400000" rotWithShape="0">
+              <a:srgbClr val="000000">
+                <a:alpha val="38000"/>
+              </a:srgbClr>
+            </a:outerShdw>
+          </a:effectLst>
+        </a:effectStyle>
+        <a:effectStyle>
+          <a:effectLst>
+            <a:outerShdw blurRad="40000" dist="23000" dir="5400000" rotWithShape="0">
+              <a:srgbClr val="000000">
+                <a:alpha val="35000"/>
+              </a:srgbClr>
+            </a:outerShdw>
+          </a:effectLst>
+        </a:effectStyle>
+        <a:effectStyle>
+          <a:effectLst>
+            <a:outerShdw blurRad="40000" dist="23000" dir="5400000" rotWithShape="0">
+              <a:srgbClr val="000000">
+                <a:alpha val="35000"/>
+              </a:srgbClr>
+            </a:outerShdw>
+          </a:effectLst>
+          <a:scene3d>
+            <a:camera prst="orthographicFront">
+              <a:rot lat="0" lon="0" rev="0"/>
+            </a:camera>
+            <a:lightRig rig="threePt" dir="t">
+              <a:rot lat="0" lon="0" rev="1200000"/>
+            </a:lightRig>
+          </a:scene3d>
+          <a:sp3d>
+            <a:bevelT w="63500" h="25400"/>
+          </a:sp3d>
+        </a:effectStyle>
+      </a:effectStyleLst>
+      <a:bgFillStyleLst>
+        <a:solidFill>
+          <a:schemeClr val="phClr"/>
+        </a:solidFill>
+        <a:gradFill rotWithShape="1">
+          <a:gsLst>
+            <a:gs pos="0">
+              <a:schemeClr val="phClr">
+                <a:tint val="40000"/>
+                <a:satMod val="350000"/>
+              </a:schemeClr>
+            </a:gs>
+            <a:gs pos="40000">
+              <a:schemeClr val="phClr">
+                <a:tint val="45000"/>
+                <a:shade val="99000"/>
+                <a:satMod val="350000"/>
+              </a:schemeClr>
+            </a:gs>
+            <a:gs pos="100000">
+              <a:schemeClr val="phClr">
+                <a:shade val="20000"/>
+                <a:satMod val="255000"/>
+              </a:schemeClr>
+            </a:gs>
+          </a:gsLst>
+          <a:path path="circle">
+            <a:fillToRect l="50000" t="-80000" r="50000" b="180000"/>
+          </a:path>
+        </a:gradFill>
+        <a:gradFill rotWithShape="1">
+          <a:gsLst>
+            <a:gs pos="0">
+              <a:schemeClr val="phClr">
+                <a:tint val="80000"/>
+                <a:satMod val="300000"/>
+              </a:schemeClr>
+            </a:gs>
+            <a:gs pos="100000">
+              <a:schemeClr val="phClr">
+                <a:shade val="30000"/>
+                <a:satMod val="200000"/>
+              </a:schemeClr>
+            </a:gs>
+          </a:gsLst>
+          <a:path path="circle">
+            <a:fillToRect l="50000" t="50000" r="50000" b="50000"/>
+          </a:path>
+        </a:gradFill>
+      </a:bgFillStyleLst>
+    </a:fmtScheme>
+  </a:themeElements>
+</a:theme>
+</file>
+
+<file path=ppt/theme/theme2.xml><?xml version="1.0" encoding="utf-8"?>
 <a:theme xmlns:a="http://schemas.openxmlformats.org/drawingml/2006/main" xmlns:r="http://schemas.openxmlformats.org/officeDocument/2006/relationships" name="Simple Light">
   <a:themeElements>
     <a:clrScheme name="Simple Light">
@@ -7072,283 +7562,4 @@
     </a:fmtScheme>
   </a:themeElements>
 </a:theme>
-</file>
-
-<file path=ppt/theme/theme2.xml><?xml version="1.0" encoding="utf-8"?>
-<a:theme xmlns:a="http://schemas.openxmlformats.org/drawingml/2006/main" xmlns:r="http://schemas.openxmlformats.org/officeDocument/2006/relationships">
-  <a:themeElements>
-    <a:clrScheme name="Default">
-      <a:dk1>
-        <a:srgbClr val="000000"/>
-      </a:dk1>
-      <a:lt1>
-        <a:srgbClr val="FFFFFF"/>
-      </a:lt1>
-      <a:dk2>
-        <a:srgbClr val="158158"/>
-      </a:dk2>
-      <a:lt2>
-        <a:srgbClr val="F3F3F3"/>
-      </a:lt2>
-      <a:accent1>
-        <a:srgbClr val="058DC7"/>
-      </a:accent1>
-      <a:accent2>
-        <a:srgbClr val="50B432"/>
-      </a:accent2>
-      <a:accent3>
-        <a:srgbClr val="ED561B"/>
-      </a:accent3>
-      <a:accent4>
-        <a:srgbClr val="EDEF00"/>
-      </a:accent4>
-      <a:accent5>
-        <a:srgbClr val="24CBE5"/>
-      </a:accent5>
-      <a:accent6>
-        <a:srgbClr val="64E572"/>
-      </a:accent6>
-      <a:hlink>
-        <a:srgbClr val="2200CC"/>
-      </a:hlink>
-      <a:folHlink>
-        <a:srgbClr val="551A8B"/>
-      </a:folHlink>
-    </a:clrScheme>
-    <a:fontScheme name="Office">
-      <a:majorFont>
-        <a:latin typeface="Arial"/>
-        <a:ea typeface=""/>
-        <a:cs typeface=""/>
-        <a:font script="Jpan" typeface="ＭＳ Ｐゴシック"/>
-        <a:font script="Hang" typeface="맑은 고딕"/>
-        <a:font script="Hans" typeface="宋体"/>
-        <a:font script="Hant" typeface="新細明體"/>
-        <a:font script="Arab" typeface="Times New Roman"/>
-        <a:font script="Hebr" typeface="Times New Roman"/>
-        <a:font script="Thai" typeface="Angsana New"/>
-        <a:font script="Ethi" typeface="Nyala"/>
-        <a:font script="Beng" typeface="Vrinda"/>
-        <a:font script="Gujr" typeface="Shruti"/>
-        <a:font script="Khmr" typeface="MoolBoran"/>
-        <a:font script="Knda" typeface="Tunga"/>
-        <a:font script="Guru" typeface="Raavi"/>
-        <a:font script="Cans" typeface="Euphemia"/>
-        <a:font script="Cher" typeface="Plantagenet Cherokee"/>
-        <a:font script="Yiii" typeface="Microsoft Yi Baiti"/>
-        <a:font script="Tibt" typeface="Microsoft Himalaya"/>
-        <a:font script="Thaa" typeface="MV Boli"/>
-        <a:font script="Deva" typeface="Mangal"/>
-        <a:font script="Telu" typeface="Gautami"/>
-        <a:font script="Taml" typeface="Latha"/>
-        <a:font script="Syrc" typeface="Estrangelo Edessa"/>
-        <a:font script="Orya" typeface="Kalinga"/>
-        <a:font script="Mlym" typeface="Kartika"/>
-        <a:font script="Laoo" typeface="DokChampa"/>
-        <a:font script="Sinh" typeface="Iskoola Pota"/>
-        <a:font script="Mong" typeface="Mongolian Baiti"/>
-        <a:font script="Viet" typeface="Times New Roman"/>
-        <a:font script="Uigh" typeface="Microsoft Uighur"/>
-        <a:font script="Geor" typeface="Sylfaen"/>
-      </a:majorFont>
-      <a:minorFont>
-        <a:latin typeface="Arial"/>
-        <a:ea typeface=""/>
-        <a:cs typeface=""/>
-        <a:font script="Jpan" typeface="ＭＳ Ｐゴシック"/>
-        <a:font script="Hang" typeface="맑은 고딕"/>
-        <a:font script="Hans" typeface="宋体"/>
-        <a:font script="Hant" typeface="新細明體"/>
-        <a:font script="Arab" typeface="Arial"/>
-        <a:font script="Hebr" typeface="Arial"/>
-        <a:font script="Thai" typeface="Cordia New"/>
-        <a:font script="Ethi" typeface="Nyala"/>
-        <a:font script="Beng" typeface="Vrinda"/>
-        <a:font script="Gujr" typeface="Shruti"/>
-        <a:font script="Khmr" typeface="DaunPenh"/>
-        <a:font script="Knda" typeface="Tunga"/>
-        <a:font script="Guru" typeface="Raavi"/>
-        <a:font script="Cans" typeface="Euphemia"/>
-        <a:font script="Cher" typeface="Plantagenet Cherokee"/>
-        <a:font script="Yiii" typeface="Microsoft Yi Baiti"/>
-        <a:font script="Tibt" typeface="Microsoft Himalaya"/>
-        <a:font script="Thaa" typeface="MV Boli"/>
-        <a:font script="Deva" typeface="Mangal"/>
-        <a:font script="Telu" typeface="Gautami"/>
-        <a:font script="Taml" typeface="Latha"/>
-        <a:font script="Syrc" typeface="Estrangelo Edessa"/>
-        <a:font script="Orya" typeface="Kalinga"/>
-        <a:font script="Mlym" typeface="Kartika"/>
-        <a:font script="Laoo" typeface="DokChampa"/>
-        <a:font script="Sinh" typeface="Iskoola Pota"/>
-        <a:font script="Mong" typeface="Mongolian Baiti"/>
-        <a:font script="Viet" typeface="Arial"/>
-        <a:font script="Uigh" typeface="Microsoft Uighur"/>
-        <a:font script="Geor" typeface="Sylfaen"/>
-      </a:minorFont>
-    </a:fontScheme>
-    <a:fmtScheme name="Office">
-      <a:fillStyleLst>
-        <a:solidFill>
-          <a:schemeClr val="phClr"/>
-        </a:solidFill>
-        <a:gradFill rotWithShape="1">
-          <a:gsLst>
-            <a:gs pos="0">
-              <a:schemeClr val="phClr">
-                <a:tint val="50000"/>
-                <a:satMod val="300000"/>
-              </a:schemeClr>
-            </a:gs>
-            <a:gs pos="35000">
-              <a:schemeClr val="phClr">
-                <a:tint val="37000"/>
-                <a:satMod val="300000"/>
-              </a:schemeClr>
-            </a:gs>
-            <a:gs pos="100000">
-              <a:schemeClr val="phClr">
-                <a:tint val="15000"/>
-                <a:satMod val="350000"/>
-              </a:schemeClr>
-            </a:gs>
-          </a:gsLst>
-          <a:lin ang="16200000" scaled="1"/>
-        </a:gradFill>
-        <a:gradFill rotWithShape="1">
-          <a:gsLst>
-            <a:gs pos="0">
-              <a:schemeClr val="phClr">
-                <a:tint val="100000"/>
-                <a:shade val="100000"/>
-                <a:satMod val="130000"/>
-              </a:schemeClr>
-            </a:gs>
-            <a:gs pos="100000">
-              <a:schemeClr val="phClr">
-                <a:tint val="50000"/>
-                <a:shade val="100000"/>
-                <a:satMod val="350000"/>
-              </a:schemeClr>
-            </a:gs>
-          </a:gsLst>
-          <a:lin ang="16200000" scaled="0"/>
-        </a:gradFill>
-      </a:fillStyleLst>
-      <a:lnStyleLst>
-        <a:ln w="9525" cap="flat" cmpd="sng" algn="ctr">
-          <a:solidFill>
-            <a:schemeClr val="phClr">
-              <a:shade val="95000"/>
-              <a:satMod val="105000"/>
-            </a:schemeClr>
-          </a:solidFill>
-          <a:prstDash val="solid"/>
-        </a:ln>
-        <a:ln w="25400" cap="flat" cmpd="sng" algn="ctr">
-          <a:solidFill>
-            <a:schemeClr val="phClr"/>
-          </a:solidFill>
-          <a:prstDash val="solid"/>
-        </a:ln>
-        <a:ln w="38100" cap="flat" cmpd="sng" algn="ctr">
-          <a:solidFill>
-            <a:schemeClr val="phClr"/>
-          </a:solidFill>
-          <a:prstDash val="solid"/>
-        </a:ln>
-      </a:lnStyleLst>
-      <a:effectStyleLst>
-        <a:effectStyle>
-          <a:effectLst>
-            <a:outerShdw blurRad="40000" dist="20000" dir="5400000" rotWithShape="0">
-              <a:srgbClr val="000000">
-                <a:alpha val="38000"/>
-              </a:srgbClr>
-            </a:outerShdw>
-          </a:effectLst>
-        </a:effectStyle>
-        <a:effectStyle>
-          <a:effectLst>
-            <a:outerShdw blurRad="40000" dist="23000" dir="5400000" rotWithShape="0">
-              <a:srgbClr val="000000">
-                <a:alpha val="35000"/>
-              </a:srgbClr>
-            </a:outerShdw>
-          </a:effectLst>
-        </a:effectStyle>
-        <a:effectStyle>
-          <a:effectLst>
-            <a:outerShdw blurRad="40000" dist="23000" dir="5400000" rotWithShape="0">
-              <a:srgbClr val="000000">
-                <a:alpha val="35000"/>
-              </a:srgbClr>
-            </a:outerShdw>
-          </a:effectLst>
-          <a:scene3d>
-            <a:camera prst="orthographicFront">
-              <a:rot lat="0" lon="0" rev="0"/>
-            </a:camera>
-            <a:lightRig rig="threePt" dir="t">
-              <a:rot lat="0" lon="0" rev="1200000"/>
-            </a:lightRig>
-          </a:scene3d>
-          <a:sp3d>
-            <a:bevelT w="63500" h="25400"/>
-          </a:sp3d>
-        </a:effectStyle>
-      </a:effectStyleLst>
-      <a:bgFillStyleLst>
-        <a:solidFill>
-          <a:schemeClr val="phClr"/>
-        </a:solidFill>
-        <a:gradFill rotWithShape="1">
-          <a:gsLst>
-            <a:gs pos="0">
-              <a:schemeClr val="phClr">
-                <a:tint val="40000"/>
-                <a:satMod val="350000"/>
-              </a:schemeClr>
-            </a:gs>
-            <a:gs pos="40000">
-              <a:schemeClr val="phClr">
-                <a:tint val="45000"/>
-                <a:shade val="99000"/>
-                <a:satMod val="350000"/>
-              </a:schemeClr>
-            </a:gs>
-            <a:gs pos="100000">
-              <a:schemeClr val="phClr">
-                <a:shade val="20000"/>
-                <a:satMod val="255000"/>
-              </a:schemeClr>
-            </a:gs>
-          </a:gsLst>
-          <a:path path="circle">
-            <a:fillToRect l="50000" t="-80000" r="50000" b="180000"/>
-          </a:path>
-        </a:gradFill>
-        <a:gradFill rotWithShape="1">
-          <a:gsLst>
-            <a:gs pos="0">
-              <a:schemeClr val="phClr">
-                <a:tint val="80000"/>
-                <a:satMod val="300000"/>
-              </a:schemeClr>
-            </a:gs>
-            <a:gs pos="100000">
-              <a:schemeClr val="phClr">
-                <a:shade val="30000"/>
-                <a:satMod val="200000"/>
-              </a:schemeClr>
-            </a:gs>
-          </a:gsLst>
-          <a:path path="circle">
-            <a:fillToRect l="50000" t="50000" r="50000" b="50000"/>
-          </a:path>
-        </a:gradFill>
-      </a:bgFillStyleLst>
-    </a:fmtScheme>
-  </a:themeElements>
-</a:theme>
 </file>
</xml_diff>

<commit_message>
Finished readme and powerpoint.
</commit_message>
<xml_diff>
--- a/Untitled presentation.pptx
+++ b/Untitled presentation.pptx
@@ -1192,7 +1192,7 @@
   <p:cSld>
     <p:spTree>
       <p:nvGrpSpPr>
-        <p:cNvPr id="80" name="Shape 80"/>
+        <p:cNvPr id="86" name="Shape 86"/>
         <p:cNvGrpSpPr/>
         <p:nvPr/>
       </p:nvGrpSpPr>
@@ -1206,7 +1206,7 @@
       </p:grpSpPr>
       <p:sp>
         <p:nvSpPr>
-          <p:cNvPr id="81" name="Google Shape;81;g23b42620657_0_20:notes"/>
+          <p:cNvPr id="87" name="Google Shape;87;g23b42620657_0_20:notes"/>
           <p:cNvSpPr/>
           <p:nvPr>
             <p:ph idx="2" type="sldImg"/>
@@ -1241,7 +1241,7 @@
       </p:sp>
       <p:sp>
         <p:nvSpPr>
-          <p:cNvPr id="82" name="Google Shape;82;g23b42620657_0_20:notes"/>
+          <p:cNvPr id="88" name="Google Shape;88;g23b42620657_0_20:notes"/>
           <p:cNvSpPr txBox="1"/>
           <p:nvPr>
             <p:ph idx="1" type="body"/>
@@ -1291,7 +1291,7 @@
   <p:cSld>
     <p:spTree>
       <p:nvGrpSpPr>
-        <p:cNvPr id="86" name="Shape 86"/>
+        <p:cNvPr id="92" name="Shape 92"/>
         <p:cNvGrpSpPr/>
         <p:nvPr/>
       </p:nvGrpSpPr>
@@ -1305,7 +1305,7 @@
       </p:grpSpPr>
       <p:sp>
         <p:nvSpPr>
-          <p:cNvPr id="87" name="Google Shape;87;g23b42620657_0_25:notes"/>
+          <p:cNvPr id="93" name="Google Shape;93;g23b42620657_0_25:notes"/>
           <p:cNvSpPr/>
           <p:nvPr>
             <p:ph idx="2" type="sldImg"/>
@@ -1340,7 +1340,7 @@
       </p:sp>
       <p:sp>
         <p:nvSpPr>
-          <p:cNvPr id="88" name="Google Shape;88;g23b42620657_0_25:notes"/>
+          <p:cNvPr id="94" name="Google Shape;94;g23b42620657_0_25:notes"/>
           <p:cNvSpPr txBox="1"/>
           <p:nvPr>
             <p:ph idx="1" type="body"/>
@@ -6612,7 +6612,7 @@
         </p:spPr>
         <p:txBody>
           <a:bodyPr anchorCtr="0" anchor="t" bIns="91425" lIns="91425" spcFirstLastPara="1" rIns="91425" wrap="square" tIns="91425">
-            <a:normAutofit/>
+            <a:normAutofit lnSpcReduction="10000"/>
           </a:bodyPr>
           <a:lstStyle/>
           <a:p>
@@ -6643,7 +6643,11 @@
             </a:pPr>
             <a:r>
               <a:rPr lang="en"/>
-              <a:t>Breakdown of tasks and roles</a:t>
+              <a:t>Breakdown of tasks and roles Geoffrey created </a:t>
+            </a:r>
+            <a:r>
+              <a:rPr lang="en"/>
+              <a:t>the diary html, and collaborated with apis, Alex created sign in page, Parth created wireframe of app, about us page, powerpoint and readme file. Price helped with setting up some features.</a:t>
             </a:r>
             <a:endParaRPr/>
           </a:p>
@@ -6659,7 +6663,23 @@
             </a:pPr>
             <a:r>
               <a:rPr lang="en"/>
-              <a:t>Challenges we encountered </a:t>
+              <a:t>Challenges we encountered, were creating a working api and getting all the features to work properly, and deploying to </a:t>
+            </a:r>
+            <a:r>
+              <a:rPr lang="en"/>
+              <a:t>heroku</a:t>
+            </a:r>
+            <a:r>
+              <a:rPr lang="en"/>
+              <a:t> but making sure all components were </a:t>
+            </a:r>
+            <a:r>
+              <a:rPr lang="en"/>
+              <a:t>aligned</a:t>
+            </a:r>
+            <a:r>
+              <a:rPr lang="en"/>
+              <a:t> properly.</a:t>
             </a:r>
             <a:endParaRPr/>
           </a:p>
@@ -6680,7 +6700,7 @@
             </a:pPr>
             <a:r>
               <a:rPr lang="en"/>
-              <a:t>Successes we encountered</a:t>
+              <a:t>Successes we encountered, was creating a properly working index, about us, diary and working html also css, lastly javascript. </a:t>
             </a:r>
             <a:endParaRPr/>
           </a:p>
@@ -6790,6 +6810,232 @@
           </a:p>
         </p:txBody>
       </p:sp>
+      <p:pic>
+        <p:nvPicPr>
+          <p:cNvPr id="80" name="Google Shape;80;p17"/>
+          <p:cNvPicPr preferRelativeResize="0"/>
+          <p:nvPr/>
+        </p:nvPicPr>
+        <p:blipFill>
+          <a:blip r:embed="rId3">
+            <a:alphaModFix/>
+          </a:blip>
+          <a:stretch>
+            <a:fillRect/>
+          </a:stretch>
+        </p:blipFill>
+        <p:spPr>
+          <a:xfrm>
+            <a:off x="353100" y="1152475"/>
+            <a:ext cx="2381126" cy="2349651"/>
+          </a:xfrm>
+          <a:prstGeom prst="rect">
+            <a:avLst/>
+          </a:prstGeom>
+          <a:noFill/>
+          <a:ln>
+            <a:noFill/>
+          </a:ln>
+        </p:spPr>
+      </p:pic>
+      <p:pic>
+        <p:nvPicPr>
+          <p:cNvPr id="81" name="Google Shape;81;p17"/>
+          <p:cNvPicPr preferRelativeResize="0"/>
+          <p:nvPr/>
+        </p:nvPicPr>
+        <p:blipFill>
+          <a:blip r:embed="rId4">
+            <a:alphaModFix/>
+          </a:blip>
+          <a:stretch>
+            <a:fillRect/>
+          </a:stretch>
+        </p:blipFill>
+        <p:spPr>
+          <a:xfrm>
+            <a:off x="2788300" y="1131775"/>
+            <a:ext cx="3153475" cy="2391050"/>
+          </a:xfrm>
+          <a:prstGeom prst="rect">
+            <a:avLst/>
+          </a:prstGeom>
+          <a:noFill/>
+          <a:ln>
+            <a:noFill/>
+          </a:ln>
+        </p:spPr>
+      </p:pic>
+      <p:pic>
+        <p:nvPicPr>
+          <p:cNvPr id="82" name="Google Shape;82;p17"/>
+          <p:cNvPicPr preferRelativeResize="0"/>
+          <p:nvPr/>
+        </p:nvPicPr>
+        <p:blipFill>
+          <a:blip r:embed="rId5">
+            <a:alphaModFix/>
+          </a:blip>
+          <a:stretch>
+            <a:fillRect/>
+          </a:stretch>
+        </p:blipFill>
+        <p:spPr>
+          <a:xfrm>
+            <a:off x="5714775" y="1063475"/>
+            <a:ext cx="2911776" cy="2438651"/>
+          </a:xfrm>
+          <a:prstGeom prst="rect">
+            <a:avLst/>
+          </a:prstGeom>
+          <a:noFill/>
+          <a:ln>
+            <a:noFill/>
+          </a:ln>
+        </p:spPr>
+      </p:pic>
+      <p:sp>
+        <p:nvSpPr>
+          <p:cNvPr id="83" name="Google Shape;83;p17"/>
+          <p:cNvSpPr txBox="1"/>
+          <p:nvPr/>
+        </p:nvSpPr>
+        <p:spPr>
+          <a:xfrm>
+            <a:off x="416025" y="3678075"/>
+            <a:ext cx="1531800" cy="831300"/>
+          </a:xfrm>
+          <a:prstGeom prst="rect">
+            <a:avLst/>
+          </a:prstGeom>
+          <a:noFill/>
+          <a:ln>
+            <a:noFill/>
+          </a:ln>
+        </p:spPr>
+        <p:txBody>
+          <a:bodyPr anchorCtr="0" anchor="t" bIns="91425" lIns="91425" spcFirstLastPara="1" rIns="91425" wrap="square" tIns="91425">
+            <a:spAutoFit/>
+          </a:bodyPr>
+          <a:lstStyle/>
+          <a:p>
+            <a:pPr indent="0" lvl="0" marL="0" rtl="0" algn="l">
+              <a:spcBef>
+                <a:spcPts val="0"/>
+              </a:spcBef>
+              <a:spcAft>
+                <a:spcPts val="0"/>
+              </a:spcAft>
+              <a:buNone/>
+            </a:pPr>
+            <a:r>
+              <a:rPr lang="en"/>
+              <a:t>Initial</a:t>
+            </a:r>
+            <a:r>
+              <a:rPr lang="en"/>
+              <a:t> Index home screen page.</a:t>
+            </a:r>
+            <a:endParaRPr/>
+          </a:p>
+        </p:txBody>
+      </p:sp>
+      <p:sp>
+        <p:nvSpPr>
+          <p:cNvPr id="84" name="Google Shape;84;p17"/>
+          <p:cNvSpPr txBox="1"/>
+          <p:nvPr/>
+        </p:nvSpPr>
+        <p:spPr>
+          <a:xfrm>
+            <a:off x="2941225" y="3636875"/>
+            <a:ext cx="2028300" cy="831300"/>
+          </a:xfrm>
+          <a:prstGeom prst="rect">
+            <a:avLst/>
+          </a:prstGeom>
+          <a:noFill/>
+          <a:ln>
+            <a:noFill/>
+          </a:ln>
+        </p:spPr>
+        <p:txBody>
+          <a:bodyPr anchorCtr="0" anchor="t" bIns="91425" lIns="91425" spcFirstLastPara="1" rIns="91425" wrap="square" tIns="91425">
+            <a:spAutoFit/>
+          </a:bodyPr>
+          <a:lstStyle/>
+          <a:p>
+            <a:pPr indent="0" lvl="0" marL="0" rtl="0" algn="l">
+              <a:spcBef>
+                <a:spcPts val="0"/>
+              </a:spcBef>
+              <a:spcAft>
+                <a:spcPts val="0"/>
+              </a:spcAft>
+              <a:buNone/>
+            </a:pPr>
+            <a:r>
+              <a:rPr lang="en"/>
+              <a:t>Fitness Diary with working date, minutes and </a:t>
+            </a:r>
+            <a:r>
+              <a:rPr lang="en"/>
+              <a:t>exercise input.</a:t>
+            </a:r>
+            <a:endParaRPr/>
+          </a:p>
+        </p:txBody>
+      </p:sp>
+      <p:sp>
+        <p:nvSpPr>
+          <p:cNvPr id="85" name="Google Shape;85;p17"/>
+          <p:cNvSpPr txBox="1"/>
+          <p:nvPr/>
+        </p:nvSpPr>
+        <p:spPr>
+          <a:xfrm>
+            <a:off x="6004550" y="3698775"/>
+            <a:ext cx="2494200" cy="831300"/>
+          </a:xfrm>
+          <a:prstGeom prst="rect">
+            <a:avLst/>
+          </a:prstGeom>
+          <a:noFill/>
+          <a:ln>
+            <a:noFill/>
+          </a:ln>
+        </p:spPr>
+        <p:txBody>
+          <a:bodyPr anchorCtr="0" anchor="t" bIns="91425" lIns="91425" spcFirstLastPara="1" rIns="91425" wrap="square" tIns="91425">
+            <a:spAutoFit/>
+          </a:bodyPr>
+          <a:lstStyle/>
+          <a:p>
+            <a:pPr indent="0" lvl="0" marL="0" rtl="0" algn="l">
+              <a:spcBef>
+                <a:spcPts val="0"/>
+              </a:spcBef>
+              <a:spcAft>
+                <a:spcPts val="0"/>
+              </a:spcAft>
+              <a:buNone/>
+            </a:pPr>
+            <a:r>
+              <a:rPr lang="en"/>
+              <a:t>About us page with </a:t>
+            </a:r>
+            <a:r>
+              <a:rPr lang="en"/>
+              <a:t>collaborators</a:t>
+            </a:r>
+            <a:r>
+              <a:rPr lang="en"/>
+              <a:t> and information about them.</a:t>
+            </a:r>
+            <a:endParaRPr/>
+          </a:p>
+        </p:txBody>
+      </p:sp>
     </p:spTree>
   </p:cSld>
   <p:clrMapOvr>
@@ -6803,7 +7049,7 @@
   <p:cSld>
     <p:spTree>
       <p:nvGrpSpPr>
-        <p:cNvPr id="83" name="Shape 83"/>
+        <p:cNvPr id="89" name="Shape 89"/>
         <p:cNvGrpSpPr/>
         <p:nvPr/>
       </p:nvGrpSpPr>
@@ -6817,7 +7063,7 @@
       </p:grpSpPr>
       <p:sp>
         <p:nvSpPr>
-          <p:cNvPr id="84" name="Google Shape;84;p18"/>
+          <p:cNvPr id="90" name="Google Shape;90;p18"/>
           <p:cNvSpPr txBox="1"/>
           <p:nvPr>
             <p:ph type="title"/>
@@ -6849,7 +7095,11 @@
             </a:pPr>
             <a:r>
               <a:rPr lang="en"/>
-              <a:t>Directions for future developement</a:t>
+              <a:t>Directions for future </a:t>
+            </a:r>
+            <a:r>
+              <a:rPr lang="en"/>
+              <a:t>development</a:t>
             </a:r>
             <a:endParaRPr/>
           </a:p>
@@ -6857,7 +7107,175 @@
       </p:sp>
       <p:sp>
         <p:nvSpPr>
-          <p:cNvPr id="85" name="Google Shape;85;p18"/>
+          <p:cNvPr id="91" name="Google Shape;91;p18"/>
+          <p:cNvSpPr txBox="1"/>
+          <p:nvPr>
+            <p:ph idx="1" type="body"/>
+          </p:nvPr>
+        </p:nvSpPr>
+        <p:spPr>
+          <a:xfrm>
+            <a:off x="311700" y="1152475"/>
+            <a:ext cx="8520600" cy="3416400"/>
+          </a:xfrm>
+          <a:prstGeom prst="rect">
+            <a:avLst/>
+          </a:prstGeom>
+        </p:spPr>
+        <p:txBody>
+          <a:bodyPr anchorCtr="0" anchor="t" bIns="91425" lIns="91425" spcFirstLastPara="1" rIns="91425" wrap="square" tIns="91425">
+            <a:normAutofit lnSpcReduction="10000"/>
+          </a:bodyPr>
+          <a:lstStyle/>
+          <a:p>
+            <a:pPr indent="0" lvl="0" marL="0" rtl="0" algn="l">
+              <a:spcBef>
+                <a:spcPts val="0"/>
+              </a:spcBef>
+              <a:spcAft>
+                <a:spcPts val="0"/>
+              </a:spcAft>
+              <a:buNone/>
+            </a:pPr>
+            <a:r>
+              <a:rPr lang="en"/>
+              <a:t>In the future we would like to incorporate a group chat feature where users can chat with each other and get updates.</a:t>
+            </a:r>
+            <a:endParaRPr/>
+          </a:p>
+          <a:p>
+            <a:pPr indent="0" lvl="0" marL="0" rtl="0" algn="l">
+              <a:spcBef>
+                <a:spcPts val="1200"/>
+              </a:spcBef>
+              <a:spcAft>
+                <a:spcPts val="0"/>
+              </a:spcAft>
+              <a:buNone/>
+            </a:pPr>
+            <a:r>
+              <a:rPr lang="en"/>
+              <a:t>We would like to create a nutritional intake out and outtake post where user can update and edit their nutritional plans and pick and choose which plan is best for them.</a:t>
+            </a:r>
+            <a:endParaRPr/>
+          </a:p>
+          <a:p>
+            <a:pPr indent="0" lvl="0" marL="0" rtl="0" algn="l">
+              <a:spcBef>
+                <a:spcPts val="1200"/>
+              </a:spcBef>
+              <a:spcAft>
+                <a:spcPts val="0"/>
+              </a:spcAft>
+              <a:buNone/>
+            </a:pPr>
+            <a:r>
+              <a:rPr lang="en"/>
+              <a:t>Incorporate a fitness gym locator to find fitness centers close to your area.</a:t>
+            </a:r>
+            <a:endParaRPr/>
+          </a:p>
+          <a:p>
+            <a:pPr indent="0" lvl="0" marL="0" rtl="0" algn="l">
+              <a:spcBef>
+                <a:spcPts val="1200"/>
+              </a:spcBef>
+              <a:spcAft>
+                <a:spcPts val="0"/>
+              </a:spcAft>
+              <a:buNone/>
+            </a:pPr>
+            <a:r>
+              <a:rPr lang="en"/>
+              <a:t>Create a fitness buddy feature where you can find fitness workout buddies close to your area.  </a:t>
+            </a:r>
+            <a:endParaRPr/>
+          </a:p>
+          <a:p>
+            <a:pPr indent="0" lvl="0" marL="0" rtl="0" algn="l">
+              <a:spcBef>
+                <a:spcPts val="1200"/>
+              </a:spcBef>
+              <a:spcAft>
+                <a:spcPts val="1200"/>
+              </a:spcAft>
+              <a:buNone/>
+            </a:pPr>
+            <a:r>
+              <a:t/>
+            </a:r>
+            <a:endParaRPr/>
+          </a:p>
+        </p:txBody>
+      </p:sp>
+    </p:spTree>
+  </p:cSld>
+  <p:clrMapOvr>
+    <a:masterClrMapping/>
+  </p:clrMapOvr>
+</p:sld>
+</file>
+
+<file path=ppt/slides/slide7.xml><?xml version="1.0" encoding="utf-8"?>
+<p:sld xmlns:a="http://schemas.openxmlformats.org/drawingml/2006/main" xmlns:r="http://schemas.openxmlformats.org/officeDocument/2006/relationships" xmlns:mc="http://schemas.openxmlformats.org/markup-compatibility/2006" xmlns:mv="urn:schemas-microsoft-com:mac:vml" xmlns:p="http://schemas.openxmlformats.org/presentationml/2006/main" xmlns:c="http://schemas.openxmlformats.org/drawingml/2006/chart" xmlns:dgm="http://schemas.openxmlformats.org/drawingml/2006/diagram" xmlns:o="urn:schemas-microsoft-com:office:office" xmlns:v="urn:schemas-microsoft-com:vml" xmlns:pvml="urn:schemas-microsoft-com:office:powerpoint" xmlns:com="http://schemas.openxmlformats.org/drawingml/2006/compatibility" xmlns:p14="http://schemas.microsoft.com/office/powerpoint/2010/main" xmlns:p15="http://schemas.microsoft.com/office/powerpoint/2012/main" xmlns:ahyp="http://schemas.microsoft.com/office/drawing/2018/hyperlinkcolor">
+  <p:cSld>
+    <p:spTree>
+      <p:nvGrpSpPr>
+        <p:cNvPr id="95" name="Shape 95"/>
+        <p:cNvGrpSpPr/>
+        <p:nvPr/>
+      </p:nvGrpSpPr>
+      <p:grpSpPr>
+        <a:xfrm>
+          <a:off x="0" y="0"/>
+          <a:ext cx="0" cy="0"/>
+          <a:chOff x="0" y="0"/>
+          <a:chExt cx="0" cy="0"/>
+        </a:xfrm>
+      </p:grpSpPr>
+      <p:sp>
+        <p:nvSpPr>
+          <p:cNvPr id="96" name="Google Shape;96;p19"/>
+          <p:cNvSpPr txBox="1"/>
+          <p:nvPr>
+            <p:ph type="title"/>
+          </p:nvPr>
+        </p:nvSpPr>
+        <p:spPr>
+          <a:xfrm>
+            <a:off x="311700" y="445025"/>
+            <a:ext cx="8520600" cy="572700"/>
+          </a:xfrm>
+          <a:prstGeom prst="rect">
+            <a:avLst/>
+          </a:prstGeom>
+        </p:spPr>
+        <p:txBody>
+          <a:bodyPr anchorCtr="0" anchor="t" bIns="91425" lIns="91425" spcFirstLastPara="1" rIns="91425" wrap="square" tIns="91425">
+            <a:normAutofit fontScale="90000"/>
+          </a:bodyPr>
+          <a:lstStyle/>
+          <a:p>
+            <a:pPr indent="0" lvl="0" marL="0" rtl="0" algn="l">
+              <a:spcBef>
+                <a:spcPts val="0"/>
+              </a:spcBef>
+              <a:spcAft>
+                <a:spcPts val="0"/>
+              </a:spcAft>
+              <a:buNone/>
+            </a:pPr>
+            <a:r>
+              <a:rPr lang="en"/>
+              <a:t>Links</a:t>
+            </a:r>
+            <a:endParaRPr/>
+          </a:p>
+        </p:txBody>
+      </p:sp>
+      <p:sp>
+        <p:nvSpPr>
+          <p:cNvPr id="97" name="Google Shape;97;p19"/>
           <p:cNvSpPr txBox="1"/>
           <p:nvPr>
             <p:ph idx="1" type="body"/>
@@ -6883,66 +7301,102 @@
                 <a:spcPts val="0"/>
               </a:spcBef>
               <a:spcAft>
+                <a:spcPts val="0"/>
+              </a:spcAft>
+              <a:buNone/>
+            </a:pPr>
+            <a:r>
+              <a:rPr lang="en" sz="1050" u="sng">
+                <a:solidFill>
+                  <a:schemeClr val="hlink"/>
+                </a:solidFill>
+                <a:hlinkClick r:id="rId3"/>
+              </a:rPr>
+              <a:t>https://www.w3schools.com/js/js_api_intro.asp</a:t>
+            </a:r>
+            <a:endParaRPr sz="1050"/>
+          </a:p>
+          <a:p>
+            <a:pPr indent="0" lvl="0" marL="0" rtl="0" algn="l">
+              <a:lnSpc>
+                <a:spcPct val="135714"/>
+              </a:lnSpc>
+              <a:spcBef>
                 <a:spcPts val="1200"/>
-              </a:spcAft>
+              </a:spcBef>
+              <a:spcAft>
+                <a:spcPts val="0"/>
+              </a:spcAft>
+              <a:buNone/>
+            </a:pPr>
+            <a:r>
+              <a:rPr lang="en" sz="1050" u="sng">
+                <a:solidFill>
+                  <a:schemeClr val="hlink"/>
+                </a:solidFill>
+                <a:highlight>
+                  <a:srgbClr val="FFFFFF"/>
+                </a:highlight>
+                <a:latin typeface="Courier New"/>
+                <a:ea typeface="Courier New"/>
+                <a:cs typeface="Courier New"/>
+                <a:sym typeface="Courier New"/>
+                <a:hlinkClick r:id="rId4"/>
+              </a:rPr>
+              <a:t>https://www.w3schools.com/html/html_css.asp</a:t>
+            </a:r>
+            <a:endParaRPr sz="1050">
+              <a:solidFill>
+                <a:schemeClr val="dk1"/>
+              </a:solidFill>
+              <a:highlight>
+                <a:srgbClr val="FFFFFF"/>
+              </a:highlight>
+              <a:latin typeface="Courier New"/>
+              <a:ea typeface="Courier New"/>
+              <a:cs typeface="Courier New"/>
+              <a:sym typeface="Courier New"/>
+            </a:endParaRPr>
+          </a:p>
+          <a:p>
+            <a:pPr indent="0" lvl="0" marL="0" rtl="0" algn="l">
+              <a:lnSpc>
+                <a:spcPct val="135714"/>
+              </a:lnSpc>
+              <a:spcBef>
+                <a:spcPts val="0"/>
+              </a:spcBef>
+              <a:spcAft>
+                <a:spcPts val="0"/>
+              </a:spcAft>
+              <a:buClr>
+                <a:schemeClr val="dk1"/>
+              </a:buClr>
+              <a:buSzPts val="1100"/>
+              <a:buFont typeface="Arial"/>
               <a:buNone/>
             </a:pPr>
             <a:r>
               <a:t/>
             </a:r>
-            <a:endParaRPr/>
+            <a:endParaRPr sz="1050">
+              <a:solidFill>
+                <a:schemeClr val="dk1"/>
+              </a:solidFill>
+              <a:highlight>
+                <a:srgbClr val="FFFFFF"/>
+              </a:highlight>
+              <a:latin typeface="Courier New"/>
+              <a:ea typeface="Courier New"/>
+              <a:cs typeface="Courier New"/>
+              <a:sym typeface="Courier New"/>
+            </a:endParaRPr>
           </a:p>
-        </p:txBody>
-      </p:sp>
-    </p:spTree>
-  </p:cSld>
-  <p:clrMapOvr>
-    <a:masterClrMapping/>
-  </p:clrMapOvr>
-</p:sld>
-</file>
-
-<file path=ppt/slides/slide7.xml><?xml version="1.0" encoding="utf-8"?>
-<p:sld xmlns:a="http://schemas.openxmlformats.org/drawingml/2006/main" xmlns:r="http://schemas.openxmlformats.org/officeDocument/2006/relationships" xmlns:mc="http://schemas.openxmlformats.org/markup-compatibility/2006" xmlns:mv="urn:schemas-microsoft-com:mac:vml" xmlns:p="http://schemas.openxmlformats.org/presentationml/2006/main" xmlns:c="http://schemas.openxmlformats.org/drawingml/2006/chart" xmlns:dgm="http://schemas.openxmlformats.org/drawingml/2006/diagram" xmlns:o="urn:schemas-microsoft-com:office:office" xmlns:v="urn:schemas-microsoft-com:vml" xmlns:pvml="urn:schemas-microsoft-com:office:powerpoint" xmlns:com="http://schemas.openxmlformats.org/drawingml/2006/compatibility" xmlns:p14="http://schemas.microsoft.com/office/powerpoint/2010/main" xmlns:p15="http://schemas.microsoft.com/office/powerpoint/2012/main" xmlns:ahyp="http://schemas.microsoft.com/office/drawing/2018/hyperlinkcolor">
-  <p:cSld>
-    <p:spTree>
-      <p:nvGrpSpPr>
-        <p:cNvPr id="89" name="Shape 89"/>
-        <p:cNvGrpSpPr/>
-        <p:nvPr/>
-      </p:nvGrpSpPr>
-      <p:grpSpPr>
-        <a:xfrm>
-          <a:off x="0" y="0"/>
-          <a:ext cx="0" cy="0"/>
-          <a:chOff x="0" y="0"/>
-          <a:chExt cx="0" cy="0"/>
-        </a:xfrm>
-      </p:grpSpPr>
-      <p:sp>
-        <p:nvSpPr>
-          <p:cNvPr id="90" name="Google Shape;90;p19"/>
-          <p:cNvSpPr txBox="1"/>
-          <p:nvPr>
-            <p:ph type="title"/>
-          </p:nvPr>
-        </p:nvSpPr>
-        <p:spPr>
-          <a:xfrm>
-            <a:off x="311700" y="445025"/>
-            <a:ext cx="8520600" cy="572700"/>
-          </a:xfrm>
-          <a:prstGeom prst="rect">
-            <a:avLst/>
-          </a:prstGeom>
-        </p:spPr>
-        <p:txBody>
-          <a:bodyPr anchorCtr="0" anchor="t" bIns="91425" lIns="91425" spcFirstLastPara="1" rIns="91425" wrap="square" tIns="91425">
-            <a:normAutofit fontScale="90000"/>
-          </a:bodyPr>
-          <a:lstStyle/>
           <a:p>
             <a:pPr indent="0" lvl="0" marL="0" rtl="0" algn="l">
+              <a:lnSpc>
+                <a:spcPct val="135714"/>
+              </a:lnSpc>
               <a:spcBef>
                 <a:spcPts val="0"/>
               </a:spcBef>
@@ -6952,35 +7406,372 @@
               <a:buNone/>
             </a:pPr>
             <a:r>
-              <a:rPr lang="en"/>
-              <a:t>Links</a:t>
+              <a:rPr lang="en" sz="1050" u="sng">
+                <a:solidFill>
+                  <a:schemeClr val="hlink"/>
+                </a:solidFill>
+                <a:highlight>
+                  <a:srgbClr val="FFFFFF"/>
+                </a:highlight>
+                <a:latin typeface="Courier New"/>
+                <a:ea typeface="Courier New"/>
+                <a:cs typeface="Courier New"/>
+                <a:sym typeface="Courier New"/>
+                <a:hlinkClick r:id="rId5"/>
+              </a:rPr>
+              <a:t>https://www.w3schools.com/html/html_scripts.asp</a:t>
             </a:r>
-            <a:endParaRPr/>
+            <a:endParaRPr sz="1050">
+              <a:solidFill>
+                <a:schemeClr val="dk1"/>
+              </a:solidFill>
+              <a:highlight>
+                <a:srgbClr val="FFFFFF"/>
+              </a:highlight>
+              <a:latin typeface="Courier New"/>
+              <a:ea typeface="Courier New"/>
+              <a:cs typeface="Courier New"/>
+              <a:sym typeface="Courier New"/>
+            </a:endParaRPr>
           </a:p>
-        </p:txBody>
-      </p:sp>
-      <p:sp>
-        <p:nvSpPr>
-          <p:cNvPr id="91" name="Google Shape;91;p19"/>
-          <p:cNvSpPr txBox="1"/>
-          <p:nvPr>
-            <p:ph idx="1" type="body"/>
-          </p:nvPr>
-        </p:nvSpPr>
-        <p:spPr>
-          <a:xfrm>
-            <a:off x="311700" y="1152475"/>
-            <a:ext cx="8520600" cy="3416400"/>
-          </a:xfrm>
-          <a:prstGeom prst="rect">
-            <a:avLst/>
-          </a:prstGeom>
-        </p:spPr>
-        <p:txBody>
-          <a:bodyPr anchorCtr="0" anchor="t" bIns="91425" lIns="91425" spcFirstLastPara="1" rIns="91425" wrap="square" tIns="91425">
-            <a:normAutofit/>
-          </a:bodyPr>
-          <a:lstStyle/>
+          <a:p>
+            <a:pPr indent="0" lvl="0" marL="0" rtl="0" algn="l">
+              <a:lnSpc>
+                <a:spcPct val="135714"/>
+              </a:lnSpc>
+              <a:spcBef>
+                <a:spcPts val="0"/>
+              </a:spcBef>
+              <a:spcAft>
+                <a:spcPts val="0"/>
+              </a:spcAft>
+              <a:buClr>
+                <a:schemeClr val="dk1"/>
+              </a:buClr>
+              <a:buSzPts val="1100"/>
+              <a:buFont typeface="Arial"/>
+              <a:buNone/>
+            </a:pPr>
+            <a:r>
+              <a:t/>
+            </a:r>
+            <a:endParaRPr sz="1050">
+              <a:solidFill>
+                <a:schemeClr val="dk1"/>
+              </a:solidFill>
+              <a:highlight>
+                <a:srgbClr val="FFFFFF"/>
+              </a:highlight>
+              <a:latin typeface="Courier New"/>
+              <a:ea typeface="Courier New"/>
+              <a:cs typeface="Courier New"/>
+              <a:sym typeface="Courier New"/>
+            </a:endParaRPr>
+          </a:p>
+          <a:p>
+            <a:pPr indent="0" lvl="0" marL="0" rtl="0" algn="l">
+              <a:lnSpc>
+                <a:spcPct val="135714"/>
+              </a:lnSpc>
+              <a:spcBef>
+                <a:spcPts val="0"/>
+              </a:spcBef>
+              <a:spcAft>
+                <a:spcPts val="0"/>
+              </a:spcAft>
+              <a:buNone/>
+            </a:pPr>
+            <a:r>
+              <a:rPr lang="en" sz="1050" u="sng">
+                <a:solidFill>
+                  <a:schemeClr val="hlink"/>
+                </a:solidFill>
+                <a:highlight>
+                  <a:srgbClr val="FFFFFF"/>
+                </a:highlight>
+                <a:latin typeface="Courier New"/>
+                <a:ea typeface="Courier New"/>
+                <a:cs typeface="Courier New"/>
+                <a:sym typeface="Courier New"/>
+                <a:hlinkClick r:id="rId6"/>
+              </a:rPr>
+              <a:t>https://www.w3schools.com/css/css_dimension.asp</a:t>
+            </a:r>
+            <a:endParaRPr sz="1050">
+              <a:solidFill>
+                <a:schemeClr val="dk1"/>
+              </a:solidFill>
+              <a:highlight>
+                <a:srgbClr val="FFFFFF"/>
+              </a:highlight>
+              <a:latin typeface="Courier New"/>
+              <a:ea typeface="Courier New"/>
+              <a:cs typeface="Courier New"/>
+              <a:sym typeface="Courier New"/>
+            </a:endParaRPr>
+          </a:p>
+          <a:p>
+            <a:pPr indent="0" lvl="0" marL="0" rtl="0" algn="l">
+              <a:lnSpc>
+                <a:spcPct val="135714"/>
+              </a:lnSpc>
+              <a:spcBef>
+                <a:spcPts val="0"/>
+              </a:spcBef>
+              <a:spcAft>
+                <a:spcPts val="0"/>
+              </a:spcAft>
+              <a:buClr>
+                <a:schemeClr val="dk1"/>
+              </a:buClr>
+              <a:buSzPts val="1100"/>
+              <a:buFont typeface="Arial"/>
+              <a:buNone/>
+            </a:pPr>
+            <a:r>
+              <a:t/>
+            </a:r>
+            <a:endParaRPr sz="1050">
+              <a:solidFill>
+                <a:schemeClr val="dk1"/>
+              </a:solidFill>
+              <a:highlight>
+                <a:srgbClr val="FFFFFF"/>
+              </a:highlight>
+              <a:latin typeface="Courier New"/>
+              <a:ea typeface="Courier New"/>
+              <a:cs typeface="Courier New"/>
+              <a:sym typeface="Courier New"/>
+            </a:endParaRPr>
+          </a:p>
+          <a:p>
+            <a:pPr indent="0" lvl="0" marL="0" rtl="0" algn="l">
+              <a:lnSpc>
+                <a:spcPct val="135714"/>
+              </a:lnSpc>
+              <a:spcBef>
+                <a:spcPts val="0"/>
+              </a:spcBef>
+              <a:spcAft>
+                <a:spcPts val="0"/>
+              </a:spcAft>
+              <a:buNone/>
+            </a:pPr>
+            <a:r>
+              <a:rPr lang="en" sz="1050" u="sng">
+                <a:solidFill>
+                  <a:schemeClr val="hlink"/>
+                </a:solidFill>
+                <a:highlight>
+                  <a:srgbClr val="FFFFFF"/>
+                </a:highlight>
+                <a:latin typeface="Courier New"/>
+                <a:ea typeface="Courier New"/>
+                <a:cs typeface="Courier New"/>
+                <a:sym typeface="Courier New"/>
+                <a:hlinkClick r:id="rId7"/>
+              </a:rPr>
+              <a:t>https://www.w3schools.com/js/js_variables.asp</a:t>
+            </a:r>
+            <a:endParaRPr sz="1050">
+              <a:solidFill>
+                <a:schemeClr val="dk1"/>
+              </a:solidFill>
+              <a:highlight>
+                <a:srgbClr val="FFFFFF"/>
+              </a:highlight>
+              <a:latin typeface="Courier New"/>
+              <a:ea typeface="Courier New"/>
+              <a:cs typeface="Courier New"/>
+              <a:sym typeface="Courier New"/>
+            </a:endParaRPr>
+          </a:p>
+          <a:p>
+            <a:pPr indent="0" lvl="0" marL="0" rtl="0" algn="l">
+              <a:lnSpc>
+                <a:spcPct val="135714"/>
+              </a:lnSpc>
+              <a:spcBef>
+                <a:spcPts val="0"/>
+              </a:spcBef>
+              <a:spcAft>
+                <a:spcPts val="0"/>
+              </a:spcAft>
+              <a:buClr>
+                <a:schemeClr val="dk1"/>
+              </a:buClr>
+              <a:buSzPts val="1100"/>
+              <a:buFont typeface="Arial"/>
+              <a:buNone/>
+            </a:pPr>
+            <a:r>
+              <a:t/>
+            </a:r>
+            <a:endParaRPr sz="1050">
+              <a:solidFill>
+                <a:schemeClr val="dk1"/>
+              </a:solidFill>
+              <a:highlight>
+                <a:srgbClr val="FFFFFF"/>
+              </a:highlight>
+              <a:latin typeface="Courier New"/>
+              <a:ea typeface="Courier New"/>
+              <a:cs typeface="Courier New"/>
+              <a:sym typeface="Courier New"/>
+            </a:endParaRPr>
+          </a:p>
+          <a:p>
+            <a:pPr indent="0" lvl="0" marL="0" rtl="0" algn="l">
+              <a:lnSpc>
+                <a:spcPct val="135714"/>
+              </a:lnSpc>
+              <a:spcBef>
+                <a:spcPts val="0"/>
+              </a:spcBef>
+              <a:spcAft>
+                <a:spcPts val="0"/>
+              </a:spcAft>
+              <a:buNone/>
+            </a:pPr>
+            <a:r>
+              <a:rPr lang="en" sz="1050" u="sng">
+                <a:solidFill>
+                  <a:schemeClr val="hlink"/>
+                </a:solidFill>
+                <a:highlight>
+                  <a:srgbClr val="FFFFFF"/>
+                </a:highlight>
+                <a:latin typeface="Courier New"/>
+                <a:ea typeface="Courier New"/>
+                <a:cs typeface="Courier New"/>
+                <a:sym typeface="Courier New"/>
+                <a:hlinkClick r:id="rId8"/>
+              </a:rPr>
+              <a:t>https://www.w3schools.com/js/js_const.asp</a:t>
+            </a:r>
+            <a:endParaRPr sz="1050">
+              <a:solidFill>
+                <a:schemeClr val="dk1"/>
+              </a:solidFill>
+              <a:highlight>
+                <a:srgbClr val="FFFFFF"/>
+              </a:highlight>
+              <a:latin typeface="Courier New"/>
+              <a:ea typeface="Courier New"/>
+              <a:cs typeface="Courier New"/>
+              <a:sym typeface="Courier New"/>
+            </a:endParaRPr>
+          </a:p>
+          <a:p>
+            <a:pPr indent="0" lvl="0" marL="0" rtl="0" algn="l">
+              <a:lnSpc>
+                <a:spcPct val="135714"/>
+              </a:lnSpc>
+              <a:spcBef>
+                <a:spcPts val="0"/>
+              </a:spcBef>
+              <a:spcAft>
+                <a:spcPts val="0"/>
+              </a:spcAft>
+              <a:buClr>
+                <a:schemeClr val="dk1"/>
+              </a:buClr>
+              <a:buSzPts val="1100"/>
+              <a:buFont typeface="Arial"/>
+              <a:buNone/>
+            </a:pPr>
+            <a:r>
+              <a:t/>
+            </a:r>
+            <a:endParaRPr sz="1050">
+              <a:solidFill>
+                <a:schemeClr val="dk1"/>
+              </a:solidFill>
+              <a:highlight>
+                <a:srgbClr val="FFFFFF"/>
+              </a:highlight>
+              <a:latin typeface="Courier New"/>
+              <a:ea typeface="Courier New"/>
+              <a:cs typeface="Courier New"/>
+              <a:sym typeface="Courier New"/>
+            </a:endParaRPr>
+          </a:p>
+          <a:p>
+            <a:pPr indent="0" lvl="0" marL="0" rtl="0" algn="l">
+              <a:lnSpc>
+                <a:spcPct val="135714"/>
+              </a:lnSpc>
+              <a:spcBef>
+                <a:spcPts val="0"/>
+              </a:spcBef>
+              <a:spcAft>
+                <a:spcPts val="0"/>
+              </a:spcAft>
+              <a:buNone/>
+            </a:pPr>
+            <a:r>
+              <a:rPr lang="en" sz="1050" u="sng">
+                <a:solidFill>
+                  <a:schemeClr val="hlink"/>
+                </a:solidFill>
+                <a:highlight>
+                  <a:srgbClr val="FFFFFF"/>
+                </a:highlight>
+                <a:latin typeface="Courier New"/>
+                <a:ea typeface="Courier New"/>
+                <a:cs typeface="Courier New"/>
+                <a:sym typeface="Courier New"/>
+                <a:hlinkClick r:id="rId9"/>
+              </a:rPr>
+              <a:t>https://www.w3schools.com/js/js_arrays.asp</a:t>
+            </a:r>
+            <a:endParaRPr sz="1050">
+              <a:solidFill>
+                <a:schemeClr val="dk1"/>
+              </a:solidFill>
+              <a:highlight>
+                <a:srgbClr val="FFFFFF"/>
+              </a:highlight>
+              <a:latin typeface="Courier New"/>
+              <a:ea typeface="Courier New"/>
+              <a:cs typeface="Courier New"/>
+              <a:sym typeface="Courier New"/>
+            </a:endParaRPr>
+          </a:p>
+          <a:p>
+            <a:pPr indent="0" lvl="0" marL="0" rtl="0" algn="l">
+              <a:lnSpc>
+                <a:spcPct val="135714"/>
+              </a:lnSpc>
+              <a:spcBef>
+                <a:spcPts val="0"/>
+              </a:spcBef>
+              <a:spcAft>
+                <a:spcPts val="0"/>
+              </a:spcAft>
+              <a:buClr>
+                <a:schemeClr val="dk1"/>
+              </a:buClr>
+              <a:buSzPts val="1100"/>
+              <a:buFont typeface="Arial"/>
+              <a:buNone/>
+            </a:pPr>
+            <a:r>
+              <a:t/>
+            </a:r>
+            <a:endParaRPr sz="1050">
+              <a:solidFill>
+                <a:schemeClr val="dk1"/>
+              </a:solidFill>
+              <a:highlight>
+                <a:srgbClr val="FFFFFF"/>
+              </a:highlight>
+              <a:latin typeface="Courier New"/>
+              <a:ea typeface="Courier New"/>
+              <a:cs typeface="Courier New"/>
+              <a:sym typeface="Courier New"/>
+            </a:endParaRPr>
+          </a:p>
           <a:p>
             <a:pPr indent="0" lvl="0" marL="0" rtl="0" algn="l">
               <a:spcBef>
@@ -7007,6 +7798,285 @@
 </file>
 
 <file path=ppt/theme/theme1.xml><?xml version="1.0" encoding="utf-8"?>
+<a:theme xmlns:a="http://schemas.openxmlformats.org/drawingml/2006/main" xmlns:r="http://schemas.openxmlformats.org/officeDocument/2006/relationships" name="Simple Light">
+  <a:themeElements>
+    <a:clrScheme name="Simple Light">
+      <a:dk1>
+        <a:srgbClr val="000000"/>
+      </a:dk1>
+      <a:lt1>
+        <a:srgbClr val="FFFFFF"/>
+      </a:lt1>
+      <a:dk2>
+        <a:srgbClr val="595959"/>
+      </a:dk2>
+      <a:lt2>
+        <a:srgbClr val="EEEEEE"/>
+      </a:lt2>
+      <a:accent1>
+        <a:srgbClr val="4285F4"/>
+      </a:accent1>
+      <a:accent2>
+        <a:srgbClr val="212121"/>
+      </a:accent2>
+      <a:accent3>
+        <a:srgbClr val="78909C"/>
+      </a:accent3>
+      <a:accent4>
+        <a:srgbClr val="FFAB40"/>
+      </a:accent4>
+      <a:accent5>
+        <a:srgbClr val="0097A7"/>
+      </a:accent5>
+      <a:accent6>
+        <a:srgbClr val="EEFF41"/>
+      </a:accent6>
+      <a:hlink>
+        <a:srgbClr val="0097A7"/>
+      </a:hlink>
+      <a:folHlink>
+        <a:srgbClr val="0097A7"/>
+      </a:folHlink>
+    </a:clrScheme>
+    <a:fontScheme name="Office">
+      <a:majorFont>
+        <a:latin typeface="Arial"/>
+        <a:ea typeface=""/>
+        <a:cs typeface=""/>
+        <a:font script="Jpan" typeface="ＭＳ Ｐゴシック"/>
+        <a:font script="Hang" typeface="맑은 고딕"/>
+        <a:font script="Hans" typeface="宋体"/>
+        <a:font script="Hant" typeface="新細明體"/>
+        <a:font script="Arab" typeface="Times New Roman"/>
+        <a:font script="Hebr" typeface="Times New Roman"/>
+        <a:font script="Thai" typeface="Angsana New"/>
+        <a:font script="Ethi" typeface="Nyala"/>
+        <a:font script="Beng" typeface="Vrinda"/>
+        <a:font script="Gujr" typeface="Shruti"/>
+        <a:font script="Khmr" typeface="MoolBoran"/>
+        <a:font script="Knda" typeface="Tunga"/>
+        <a:font script="Guru" typeface="Raavi"/>
+        <a:font script="Cans" typeface="Euphemia"/>
+        <a:font script="Cher" typeface="Plantagenet Cherokee"/>
+        <a:font script="Yiii" typeface="Microsoft Yi Baiti"/>
+        <a:font script="Tibt" typeface="Microsoft Himalaya"/>
+        <a:font script="Thaa" typeface="MV Boli"/>
+        <a:font script="Deva" typeface="Mangal"/>
+        <a:font script="Telu" typeface="Gautami"/>
+        <a:font script="Taml" typeface="Latha"/>
+        <a:font script="Syrc" typeface="Estrangelo Edessa"/>
+        <a:font script="Orya" typeface="Kalinga"/>
+        <a:font script="Mlym" typeface="Kartika"/>
+        <a:font script="Laoo" typeface="DokChampa"/>
+        <a:font script="Sinh" typeface="Iskoola Pota"/>
+        <a:font script="Mong" typeface="Mongolian Baiti"/>
+        <a:font script="Viet" typeface="Times New Roman"/>
+        <a:font script="Uigh" typeface="Microsoft Uighur"/>
+        <a:font script="Geor" typeface="Sylfaen"/>
+      </a:majorFont>
+      <a:minorFont>
+        <a:latin typeface="Arial"/>
+        <a:ea typeface=""/>
+        <a:cs typeface=""/>
+        <a:font script="Jpan" typeface="ＭＳ Ｐゴシック"/>
+        <a:font script="Hang" typeface="맑은 고딕"/>
+        <a:font script="Hans" typeface="宋体"/>
+        <a:font script="Hant" typeface="新細明體"/>
+        <a:font script="Arab" typeface="Arial"/>
+        <a:font script="Hebr" typeface="Arial"/>
+        <a:font script="Thai" typeface="Cordia New"/>
+        <a:font script="Ethi" typeface="Nyala"/>
+        <a:font script="Beng" typeface="Vrinda"/>
+        <a:font script="Gujr" typeface="Shruti"/>
+        <a:font script="Khmr" typeface="DaunPenh"/>
+        <a:font script="Knda" typeface="Tunga"/>
+        <a:font script="Guru" typeface="Raavi"/>
+        <a:font script="Cans" typeface="Euphemia"/>
+        <a:font script="Cher" typeface="Plantagenet Cherokee"/>
+        <a:font script="Yiii" typeface="Microsoft Yi Baiti"/>
+        <a:font script="Tibt" typeface="Microsoft Himalaya"/>
+        <a:font script="Thaa" typeface="MV Boli"/>
+        <a:font script="Deva" typeface="Mangal"/>
+        <a:font script="Telu" typeface="Gautami"/>
+        <a:font script="Taml" typeface="Latha"/>
+        <a:font script="Syrc" typeface="Estrangelo Edessa"/>
+        <a:font script="Orya" typeface="Kalinga"/>
+        <a:font script="Mlym" typeface="Kartika"/>
+        <a:font script="Laoo" typeface="DokChampa"/>
+        <a:font script="Sinh" typeface="Iskoola Pota"/>
+        <a:font script="Mong" typeface="Mongolian Baiti"/>
+        <a:font script="Viet" typeface="Arial"/>
+        <a:font script="Uigh" typeface="Microsoft Uighur"/>
+        <a:font script="Geor" typeface="Sylfaen"/>
+      </a:minorFont>
+    </a:fontScheme>
+    <a:fmtScheme name="Office">
+      <a:fillStyleLst>
+        <a:solidFill>
+          <a:schemeClr val="phClr"/>
+        </a:solidFill>
+        <a:gradFill rotWithShape="1">
+          <a:gsLst>
+            <a:gs pos="0">
+              <a:schemeClr val="phClr">
+                <a:tint val="50000"/>
+                <a:satMod val="300000"/>
+              </a:schemeClr>
+            </a:gs>
+            <a:gs pos="35000">
+              <a:schemeClr val="phClr">
+                <a:tint val="37000"/>
+                <a:satMod val="300000"/>
+              </a:schemeClr>
+            </a:gs>
+            <a:gs pos="100000">
+              <a:schemeClr val="phClr">
+                <a:tint val="15000"/>
+                <a:satMod val="350000"/>
+              </a:schemeClr>
+            </a:gs>
+          </a:gsLst>
+          <a:lin ang="16200000" scaled="1"/>
+        </a:gradFill>
+        <a:gradFill rotWithShape="1">
+          <a:gsLst>
+            <a:gs pos="0">
+              <a:schemeClr val="phClr">
+                <a:tint val="100000"/>
+                <a:shade val="100000"/>
+                <a:satMod val="130000"/>
+              </a:schemeClr>
+            </a:gs>
+            <a:gs pos="100000">
+              <a:schemeClr val="phClr">
+                <a:tint val="50000"/>
+                <a:shade val="100000"/>
+                <a:satMod val="350000"/>
+              </a:schemeClr>
+            </a:gs>
+          </a:gsLst>
+          <a:lin ang="16200000" scaled="0"/>
+        </a:gradFill>
+      </a:fillStyleLst>
+      <a:lnStyleLst>
+        <a:ln w="9525" cap="flat" cmpd="sng" algn="ctr">
+          <a:solidFill>
+            <a:schemeClr val="phClr">
+              <a:shade val="95000"/>
+              <a:satMod val="105000"/>
+            </a:schemeClr>
+          </a:solidFill>
+          <a:prstDash val="solid"/>
+        </a:ln>
+        <a:ln w="25400" cap="flat" cmpd="sng" algn="ctr">
+          <a:solidFill>
+            <a:schemeClr val="phClr"/>
+          </a:solidFill>
+          <a:prstDash val="solid"/>
+        </a:ln>
+        <a:ln w="38100" cap="flat" cmpd="sng" algn="ctr">
+          <a:solidFill>
+            <a:schemeClr val="phClr"/>
+          </a:solidFill>
+          <a:prstDash val="solid"/>
+        </a:ln>
+      </a:lnStyleLst>
+      <a:effectStyleLst>
+        <a:effectStyle>
+          <a:effectLst>
+            <a:outerShdw blurRad="40000" dist="20000" dir="5400000" rotWithShape="0">
+              <a:srgbClr val="000000">
+                <a:alpha val="38000"/>
+              </a:srgbClr>
+            </a:outerShdw>
+          </a:effectLst>
+        </a:effectStyle>
+        <a:effectStyle>
+          <a:effectLst>
+            <a:outerShdw blurRad="40000" dist="23000" dir="5400000" rotWithShape="0">
+              <a:srgbClr val="000000">
+                <a:alpha val="35000"/>
+              </a:srgbClr>
+            </a:outerShdw>
+          </a:effectLst>
+        </a:effectStyle>
+        <a:effectStyle>
+          <a:effectLst>
+            <a:outerShdw blurRad="40000" dist="23000" dir="5400000" rotWithShape="0">
+              <a:srgbClr val="000000">
+                <a:alpha val="35000"/>
+              </a:srgbClr>
+            </a:outerShdw>
+          </a:effectLst>
+          <a:scene3d>
+            <a:camera prst="orthographicFront">
+              <a:rot lat="0" lon="0" rev="0"/>
+            </a:camera>
+            <a:lightRig rig="threePt" dir="t">
+              <a:rot lat="0" lon="0" rev="1200000"/>
+            </a:lightRig>
+          </a:scene3d>
+          <a:sp3d>
+            <a:bevelT w="63500" h="25400"/>
+          </a:sp3d>
+        </a:effectStyle>
+      </a:effectStyleLst>
+      <a:bgFillStyleLst>
+        <a:solidFill>
+          <a:schemeClr val="phClr"/>
+        </a:solidFill>
+        <a:gradFill rotWithShape="1">
+          <a:gsLst>
+            <a:gs pos="0">
+              <a:schemeClr val="phClr">
+                <a:tint val="40000"/>
+                <a:satMod val="350000"/>
+              </a:schemeClr>
+            </a:gs>
+            <a:gs pos="40000">
+              <a:schemeClr val="phClr">
+                <a:tint val="45000"/>
+                <a:shade val="99000"/>
+                <a:satMod val="350000"/>
+              </a:schemeClr>
+            </a:gs>
+            <a:gs pos="100000">
+              <a:schemeClr val="phClr">
+                <a:shade val="20000"/>
+                <a:satMod val="255000"/>
+              </a:schemeClr>
+            </a:gs>
+          </a:gsLst>
+          <a:path path="circle">
+            <a:fillToRect l="50000" t="-80000" r="50000" b="180000"/>
+          </a:path>
+        </a:gradFill>
+        <a:gradFill rotWithShape="1">
+          <a:gsLst>
+            <a:gs pos="0">
+              <a:schemeClr val="phClr">
+                <a:tint val="80000"/>
+                <a:satMod val="300000"/>
+              </a:schemeClr>
+            </a:gs>
+            <a:gs pos="100000">
+              <a:schemeClr val="phClr">
+                <a:shade val="30000"/>
+                <a:satMod val="200000"/>
+              </a:schemeClr>
+            </a:gs>
+          </a:gsLst>
+          <a:path path="circle">
+            <a:fillToRect l="50000" t="50000" r="50000" b="50000"/>
+          </a:path>
+        </a:gradFill>
+      </a:bgFillStyleLst>
+    </a:fmtScheme>
+  </a:themeElements>
+</a:theme>
+</file>
+
+<file path=ppt/theme/theme2.xml><?xml version="1.0" encoding="utf-8"?>
 <a:theme xmlns:a="http://schemas.openxmlformats.org/drawingml/2006/main" xmlns:r="http://schemas.openxmlformats.org/officeDocument/2006/relationships">
   <a:themeElements>
     <a:clrScheme name="Default">
@@ -7283,283 +8353,4 @@
     </a:fmtScheme>
   </a:themeElements>
 </a:theme>
-</file>
-
-<file path=ppt/theme/theme2.xml><?xml version="1.0" encoding="utf-8"?>
-<a:theme xmlns:a="http://schemas.openxmlformats.org/drawingml/2006/main" xmlns:r="http://schemas.openxmlformats.org/officeDocument/2006/relationships" name="Simple Light">
-  <a:themeElements>
-    <a:clrScheme name="Simple Light">
-      <a:dk1>
-        <a:srgbClr val="000000"/>
-      </a:dk1>
-      <a:lt1>
-        <a:srgbClr val="FFFFFF"/>
-      </a:lt1>
-      <a:dk2>
-        <a:srgbClr val="595959"/>
-      </a:dk2>
-      <a:lt2>
-        <a:srgbClr val="EEEEEE"/>
-      </a:lt2>
-      <a:accent1>
-        <a:srgbClr val="4285F4"/>
-      </a:accent1>
-      <a:accent2>
-        <a:srgbClr val="212121"/>
-      </a:accent2>
-      <a:accent3>
-        <a:srgbClr val="78909C"/>
-      </a:accent3>
-      <a:accent4>
-        <a:srgbClr val="FFAB40"/>
-      </a:accent4>
-      <a:accent5>
-        <a:srgbClr val="0097A7"/>
-      </a:accent5>
-      <a:accent6>
-        <a:srgbClr val="EEFF41"/>
-      </a:accent6>
-      <a:hlink>
-        <a:srgbClr val="0097A7"/>
-      </a:hlink>
-      <a:folHlink>
-        <a:srgbClr val="0097A7"/>
-      </a:folHlink>
-    </a:clrScheme>
-    <a:fontScheme name="Office">
-      <a:majorFont>
-        <a:latin typeface="Arial"/>
-        <a:ea typeface=""/>
-        <a:cs typeface=""/>
-        <a:font script="Jpan" typeface="ＭＳ Ｐゴシック"/>
-        <a:font script="Hang" typeface="맑은 고딕"/>
-        <a:font script="Hans" typeface="宋体"/>
-        <a:font script="Hant" typeface="新細明體"/>
-        <a:font script="Arab" typeface="Times New Roman"/>
-        <a:font script="Hebr" typeface="Times New Roman"/>
-        <a:font script="Thai" typeface="Angsana New"/>
-        <a:font script="Ethi" typeface="Nyala"/>
-        <a:font script="Beng" typeface="Vrinda"/>
-        <a:font script="Gujr" typeface="Shruti"/>
-        <a:font script="Khmr" typeface="MoolBoran"/>
-        <a:font script="Knda" typeface="Tunga"/>
-        <a:font script="Guru" typeface="Raavi"/>
-        <a:font script="Cans" typeface="Euphemia"/>
-        <a:font script="Cher" typeface="Plantagenet Cherokee"/>
-        <a:font script="Yiii" typeface="Microsoft Yi Baiti"/>
-        <a:font script="Tibt" typeface="Microsoft Himalaya"/>
-        <a:font script="Thaa" typeface="MV Boli"/>
-        <a:font script="Deva" typeface="Mangal"/>
-        <a:font script="Telu" typeface="Gautami"/>
-        <a:font script="Taml" typeface="Latha"/>
-        <a:font script="Syrc" typeface="Estrangelo Edessa"/>
-        <a:font script="Orya" typeface="Kalinga"/>
-        <a:font script="Mlym" typeface="Kartika"/>
-        <a:font script="Laoo" typeface="DokChampa"/>
-        <a:font script="Sinh" typeface="Iskoola Pota"/>
-        <a:font script="Mong" typeface="Mongolian Baiti"/>
-        <a:font script="Viet" typeface="Times New Roman"/>
-        <a:font script="Uigh" typeface="Microsoft Uighur"/>
-        <a:font script="Geor" typeface="Sylfaen"/>
-      </a:majorFont>
-      <a:minorFont>
-        <a:latin typeface="Arial"/>
-        <a:ea typeface=""/>
-        <a:cs typeface=""/>
-        <a:font script="Jpan" typeface="ＭＳ Ｐゴシック"/>
-        <a:font script="Hang" typeface="맑은 고딕"/>
-        <a:font script="Hans" typeface="宋体"/>
-        <a:font script="Hant" typeface="新細明體"/>
-        <a:font script="Arab" typeface="Arial"/>
-        <a:font script="Hebr" typeface="Arial"/>
-        <a:font script="Thai" typeface="Cordia New"/>
-        <a:font script="Ethi" typeface="Nyala"/>
-        <a:font script="Beng" typeface="Vrinda"/>
-        <a:font script="Gujr" typeface="Shruti"/>
-        <a:font script="Khmr" typeface="DaunPenh"/>
-        <a:font script="Knda" typeface="Tunga"/>
-        <a:font script="Guru" typeface="Raavi"/>
-        <a:font script="Cans" typeface="Euphemia"/>
-        <a:font script="Cher" typeface="Plantagenet Cherokee"/>
-        <a:font script="Yiii" typeface="Microsoft Yi Baiti"/>
-        <a:font script="Tibt" typeface="Microsoft Himalaya"/>
-        <a:font script="Thaa" typeface="MV Boli"/>
-        <a:font script="Deva" typeface="Mangal"/>
-        <a:font script="Telu" typeface="Gautami"/>
-        <a:font script="Taml" typeface="Latha"/>
-        <a:font script="Syrc" typeface="Estrangelo Edessa"/>
-        <a:font script="Orya" typeface="Kalinga"/>
-        <a:font script="Mlym" typeface="Kartika"/>
-        <a:font script="Laoo" typeface="DokChampa"/>
-        <a:font script="Sinh" typeface="Iskoola Pota"/>
-        <a:font script="Mong" typeface="Mongolian Baiti"/>
-        <a:font script="Viet" typeface="Arial"/>
-        <a:font script="Uigh" typeface="Microsoft Uighur"/>
-        <a:font script="Geor" typeface="Sylfaen"/>
-      </a:minorFont>
-    </a:fontScheme>
-    <a:fmtScheme name="Office">
-      <a:fillStyleLst>
-        <a:solidFill>
-          <a:schemeClr val="phClr"/>
-        </a:solidFill>
-        <a:gradFill rotWithShape="1">
-          <a:gsLst>
-            <a:gs pos="0">
-              <a:schemeClr val="phClr">
-                <a:tint val="50000"/>
-                <a:satMod val="300000"/>
-              </a:schemeClr>
-            </a:gs>
-            <a:gs pos="35000">
-              <a:schemeClr val="phClr">
-                <a:tint val="37000"/>
-                <a:satMod val="300000"/>
-              </a:schemeClr>
-            </a:gs>
-            <a:gs pos="100000">
-              <a:schemeClr val="phClr">
-                <a:tint val="15000"/>
-                <a:satMod val="350000"/>
-              </a:schemeClr>
-            </a:gs>
-          </a:gsLst>
-          <a:lin ang="16200000" scaled="1"/>
-        </a:gradFill>
-        <a:gradFill rotWithShape="1">
-          <a:gsLst>
-            <a:gs pos="0">
-              <a:schemeClr val="phClr">
-                <a:tint val="100000"/>
-                <a:shade val="100000"/>
-                <a:satMod val="130000"/>
-              </a:schemeClr>
-            </a:gs>
-            <a:gs pos="100000">
-              <a:schemeClr val="phClr">
-                <a:tint val="50000"/>
-                <a:shade val="100000"/>
-                <a:satMod val="350000"/>
-              </a:schemeClr>
-            </a:gs>
-          </a:gsLst>
-          <a:lin ang="16200000" scaled="0"/>
-        </a:gradFill>
-      </a:fillStyleLst>
-      <a:lnStyleLst>
-        <a:ln w="9525" cap="flat" cmpd="sng" algn="ctr">
-          <a:solidFill>
-            <a:schemeClr val="phClr">
-              <a:shade val="95000"/>
-              <a:satMod val="105000"/>
-            </a:schemeClr>
-          </a:solidFill>
-          <a:prstDash val="solid"/>
-        </a:ln>
-        <a:ln w="25400" cap="flat" cmpd="sng" algn="ctr">
-          <a:solidFill>
-            <a:schemeClr val="phClr"/>
-          </a:solidFill>
-          <a:prstDash val="solid"/>
-        </a:ln>
-        <a:ln w="38100" cap="flat" cmpd="sng" algn="ctr">
-          <a:solidFill>
-            <a:schemeClr val="phClr"/>
-          </a:solidFill>
-          <a:prstDash val="solid"/>
-        </a:ln>
-      </a:lnStyleLst>
-      <a:effectStyleLst>
-        <a:effectStyle>
-          <a:effectLst>
-            <a:outerShdw blurRad="40000" dist="20000" dir="5400000" rotWithShape="0">
-              <a:srgbClr val="000000">
-                <a:alpha val="38000"/>
-              </a:srgbClr>
-            </a:outerShdw>
-          </a:effectLst>
-        </a:effectStyle>
-        <a:effectStyle>
-          <a:effectLst>
-            <a:outerShdw blurRad="40000" dist="23000" dir="5400000" rotWithShape="0">
-              <a:srgbClr val="000000">
-                <a:alpha val="35000"/>
-              </a:srgbClr>
-            </a:outerShdw>
-          </a:effectLst>
-        </a:effectStyle>
-        <a:effectStyle>
-          <a:effectLst>
-            <a:outerShdw blurRad="40000" dist="23000" dir="5400000" rotWithShape="0">
-              <a:srgbClr val="000000">
-                <a:alpha val="35000"/>
-              </a:srgbClr>
-            </a:outerShdw>
-          </a:effectLst>
-          <a:scene3d>
-            <a:camera prst="orthographicFront">
-              <a:rot lat="0" lon="0" rev="0"/>
-            </a:camera>
-            <a:lightRig rig="threePt" dir="t">
-              <a:rot lat="0" lon="0" rev="1200000"/>
-            </a:lightRig>
-          </a:scene3d>
-          <a:sp3d>
-            <a:bevelT w="63500" h="25400"/>
-          </a:sp3d>
-        </a:effectStyle>
-      </a:effectStyleLst>
-      <a:bgFillStyleLst>
-        <a:solidFill>
-          <a:schemeClr val="phClr"/>
-        </a:solidFill>
-        <a:gradFill rotWithShape="1">
-          <a:gsLst>
-            <a:gs pos="0">
-              <a:schemeClr val="phClr">
-                <a:tint val="40000"/>
-                <a:satMod val="350000"/>
-              </a:schemeClr>
-            </a:gs>
-            <a:gs pos="40000">
-              <a:schemeClr val="phClr">
-                <a:tint val="45000"/>
-                <a:shade val="99000"/>
-                <a:satMod val="350000"/>
-              </a:schemeClr>
-            </a:gs>
-            <a:gs pos="100000">
-              <a:schemeClr val="phClr">
-                <a:shade val="20000"/>
-                <a:satMod val="255000"/>
-              </a:schemeClr>
-            </a:gs>
-          </a:gsLst>
-          <a:path path="circle">
-            <a:fillToRect l="50000" t="-80000" r="50000" b="180000"/>
-          </a:path>
-        </a:gradFill>
-        <a:gradFill rotWithShape="1">
-          <a:gsLst>
-            <a:gs pos="0">
-              <a:schemeClr val="phClr">
-                <a:tint val="80000"/>
-                <a:satMod val="300000"/>
-              </a:schemeClr>
-            </a:gs>
-            <a:gs pos="100000">
-              <a:schemeClr val="phClr">
-                <a:shade val="30000"/>
-                <a:satMod val="200000"/>
-              </a:schemeClr>
-            </a:gs>
-          </a:gsLst>
-          <a:path path="circle">
-            <a:fillToRect l="50000" t="50000" r="50000" b="50000"/>
-          </a:path>
-        </a:gradFill>
-      </a:bgFillStyleLst>
-    </a:fmtScheme>
-  </a:themeElements>
-</a:theme>
 </file>
</xml_diff>